<commit_message>
read me update, functionality finish
</commit_message>
<xml_diff>
--- a/ubd_ppt.pptx
+++ b/ubd_ppt.pptx
@@ -2972,7 +2972,7 @@
         </p:nvSpPr>
         <p:spPr>
           <a:xfrm>
-            <a:off x="1029806" y="1084043"/>
+            <a:off x="1733119" y="1132224"/>
             <a:ext cx="8768050" cy="276999"/>
           </a:xfrm>
           <a:prstGeom prst="rect">
@@ -2986,106 +2986,119 @@
           <a:lstStyle/>
           <a:p>
             <a:r>
-              <a:rPr lang="ko-KR" altLang="en-US" sz="1200" b="0" i="0" dirty="0" err="1" smtClean="0">
-                <a:solidFill>
-                  <a:srgbClr val="333333"/>
-                </a:solidFill>
-                <a:effectLst/>
-                <a:latin typeface="나눔고딕"/>
+              <a:rPr lang="ko-KR" altLang="en-US" sz="1200" b="0" i="0" err="1" smtClean="0">
+                <a:solidFill>
+                  <a:srgbClr val="333333"/>
+                </a:solidFill>
+                <a:effectLst/>
+                <a:latin typeface="나눔바른고딕" panose="020B0603020101020101" pitchFamily="50" charset="-127"/>
+                <a:ea typeface="나눔바른고딕" panose="020B0603020101020101" pitchFamily="50" charset="-127"/>
               </a:rPr>
               <a:t>클레멘타임</a:t>
             </a:r>
             <a:r>
-              <a:rPr lang="ko-KR" altLang="en-US" sz="1200" b="0" i="0" dirty="0" smtClean="0">
-                <a:solidFill>
-                  <a:srgbClr val="333333"/>
-                </a:solidFill>
-                <a:effectLst/>
-                <a:latin typeface="나눔고딕"/>
+              <a:rPr lang="ko-KR" altLang="en-US" sz="1200" b="0" i="0" smtClean="0">
+                <a:solidFill>
+                  <a:srgbClr val="333333"/>
+                </a:solidFill>
+                <a:effectLst/>
+                <a:latin typeface="나눔바른고딕" panose="020B0603020101020101" pitchFamily="50" charset="-127"/>
+                <a:ea typeface="나눔바른고딕" panose="020B0603020101020101" pitchFamily="50" charset="-127"/>
               </a:rPr>
               <a:t> 중에 </a:t>
             </a:r>
             <a:r>
-              <a:rPr lang="ko-KR" altLang="en-US" sz="1200" b="0" i="0" dirty="0" err="1" smtClean="0">
-                <a:solidFill>
-                  <a:srgbClr val="333333"/>
-                </a:solidFill>
-                <a:effectLst/>
-                <a:latin typeface="나눔고딕"/>
+              <a:rPr lang="ko-KR" altLang="en-US" sz="1200" b="0" i="0" err="1" smtClean="0">
+                <a:solidFill>
+                  <a:srgbClr val="333333"/>
+                </a:solidFill>
+                <a:effectLst/>
+                <a:latin typeface="나눔바른고딕" panose="020B0603020101020101" pitchFamily="50" charset="-127"/>
+                <a:ea typeface="나눔바른고딕" panose="020B0603020101020101" pitchFamily="50" charset="-127"/>
               </a:rPr>
               <a:t>뭘볼지</a:t>
             </a:r>
             <a:r>
-              <a:rPr lang="ko-KR" altLang="en-US" sz="1200" b="0" i="0" dirty="0" smtClean="0">
-                <a:solidFill>
-                  <a:srgbClr val="333333"/>
-                </a:solidFill>
-                <a:effectLst/>
-                <a:latin typeface="나눔고딕"/>
+              <a:rPr lang="ko-KR" altLang="en-US" sz="1200" b="0" i="0" smtClean="0">
+                <a:solidFill>
+                  <a:srgbClr val="333333"/>
+                </a:solidFill>
+                <a:effectLst/>
+                <a:latin typeface="나눔바른고딕" panose="020B0603020101020101" pitchFamily="50" charset="-127"/>
+                <a:ea typeface="나눔바른고딕" panose="020B0603020101020101" pitchFamily="50" charset="-127"/>
               </a:rPr>
               <a:t> 고민하다 </a:t>
             </a:r>
             <a:r>
-              <a:rPr lang="ko-KR" altLang="en-US" sz="1200" b="0" i="0" dirty="0" err="1" smtClean="0">
-                <a:solidFill>
-                  <a:srgbClr val="333333"/>
-                </a:solidFill>
-                <a:effectLst/>
-                <a:latin typeface="나눔고딕"/>
+              <a:rPr lang="ko-KR" altLang="en-US" sz="1200" b="0" i="0" err="1" smtClean="0">
+                <a:solidFill>
+                  <a:srgbClr val="333333"/>
+                </a:solidFill>
+                <a:effectLst/>
+                <a:latin typeface="나눔바른고딕" panose="020B0603020101020101" pitchFamily="50" charset="-127"/>
+                <a:ea typeface="나눔바른고딕" panose="020B0603020101020101" pitchFamily="50" charset="-127"/>
               </a:rPr>
               <a:t>둘다봤습니다</a:t>
             </a:r>
             <a:r>
-              <a:rPr lang="en-US" altLang="ko-KR" sz="1200" b="0" i="0" dirty="0" smtClean="0">
-                <a:solidFill>
-                  <a:srgbClr val="333333"/>
-                </a:solidFill>
-                <a:effectLst/>
-                <a:latin typeface="나눔고딕"/>
+              <a:rPr lang="en-US" altLang="ko-KR" sz="1200" b="0" i="0" smtClean="0">
+                <a:solidFill>
+                  <a:srgbClr val="333333"/>
+                </a:solidFill>
+                <a:effectLst/>
+                <a:latin typeface="나눔바른고딕" panose="020B0603020101020101" pitchFamily="50" charset="-127"/>
+                <a:ea typeface="나눔바른고딕" panose="020B0603020101020101" pitchFamily="50" charset="-127"/>
               </a:rPr>
               <a:t>. </a:t>
             </a:r>
             <a:r>
-              <a:rPr lang="ko-KR" altLang="en-US" sz="1200" b="0" i="0" dirty="0" smtClean="0">
-                <a:solidFill>
-                  <a:srgbClr val="333333"/>
-                </a:solidFill>
-                <a:effectLst/>
-                <a:latin typeface="나눔고딕"/>
+              <a:rPr lang="ko-KR" altLang="en-US" sz="1200" b="0" i="0" smtClean="0">
+                <a:solidFill>
+                  <a:srgbClr val="333333"/>
+                </a:solidFill>
+                <a:effectLst/>
+                <a:latin typeface="나눔바른고딕" panose="020B0603020101020101" pitchFamily="50" charset="-127"/>
+                <a:ea typeface="나눔바른고딕" panose="020B0603020101020101" pitchFamily="50" charset="-127"/>
               </a:rPr>
               <a:t>물론 </a:t>
             </a:r>
             <a:r>
-              <a:rPr lang="en-US" altLang="ko-KR" sz="1200" b="0" i="0" dirty="0" smtClean="0">
-                <a:solidFill>
-                  <a:srgbClr val="333333"/>
-                </a:solidFill>
-                <a:effectLst/>
-                <a:latin typeface="나눔고딕"/>
+              <a:rPr lang="en-US" altLang="ko-KR" sz="1200" b="0" i="0" smtClean="0">
+                <a:solidFill>
+                  <a:srgbClr val="333333"/>
+                </a:solidFill>
+                <a:effectLst/>
+                <a:latin typeface="나눔바른고딕" panose="020B0603020101020101" pitchFamily="50" charset="-127"/>
+                <a:ea typeface="나눔바른고딕" panose="020B0603020101020101" pitchFamily="50" charset="-127"/>
               </a:rPr>
               <a:t>10</a:t>
             </a:r>
             <a:r>
-              <a:rPr lang="ko-KR" altLang="en-US" sz="1200" b="0" i="0" dirty="0" smtClean="0">
-                <a:solidFill>
-                  <a:srgbClr val="333333"/>
-                </a:solidFill>
-                <a:effectLst/>
-                <a:latin typeface="나눔고딕"/>
+              <a:rPr lang="ko-KR" altLang="en-US" sz="1200" b="0" i="0" smtClean="0">
+                <a:solidFill>
+                  <a:srgbClr val="333333"/>
+                </a:solidFill>
+                <a:effectLst/>
+                <a:latin typeface="나눔바른고딕" panose="020B0603020101020101" pitchFamily="50" charset="-127"/>
+                <a:ea typeface="나눔바른고딕" panose="020B0603020101020101" pitchFamily="50" charset="-127"/>
               </a:rPr>
               <a:t>점은 저에게 주는 </a:t>
             </a:r>
             <a:r>
-              <a:rPr lang="ko-KR" altLang="en-US" sz="1200" b="0" i="0" dirty="0" err="1" smtClean="0">
-                <a:solidFill>
-                  <a:srgbClr val="333333"/>
-                </a:solidFill>
-                <a:effectLst/>
-                <a:latin typeface="나눔고딕"/>
+              <a:rPr lang="ko-KR" altLang="en-US" sz="1200" b="0" i="0" err="1" smtClean="0">
+                <a:solidFill>
+                  <a:srgbClr val="333333"/>
+                </a:solidFill>
+                <a:effectLst/>
+                <a:latin typeface="나눔바른고딕" panose="020B0603020101020101" pitchFamily="50" charset="-127"/>
+                <a:ea typeface="나눔바른고딕" panose="020B0603020101020101" pitchFamily="50" charset="-127"/>
               </a:rPr>
               <a:t>점수구요</a:t>
             </a:r>
-            <a:endParaRPr lang="ko-KR" altLang="en-US" sz="1200" dirty="0"/>
+            <a:endParaRPr lang="ko-KR" altLang="en-US" sz="1200">
+              <a:latin typeface="나눔바른고딕" panose="020B0603020101020101" pitchFamily="50" charset="-127"/>
+              <a:ea typeface="나눔바른고딕" panose="020B0603020101020101" pitchFamily="50" charset="-127"/>
+            </a:endParaRPr>
           </a:p>
         </p:txBody>
       </p:sp>
@@ -3097,7 +3110,7 @@
         </p:nvSpPr>
         <p:spPr>
           <a:xfrm>
-            <a:off x="4535900" y="1935519"/>
+            <a:off x="4596277" y="1935519"/>
             <a:ext cx="9144000" cy="307777"/>
           </a:xfrm>
           <a:prstGeom prst="rect">
@@ -3111,106 +3124,119 @@
           <a:lstStyle/>
           <a:p>
             <a:r>
-              <a:rPr lang="ko-KR" altLang="en-US" sz="1400" b="0" i="0" dirty="0" smtClean="0">
-                <a:solidFill>
-                  <a:srgbClr val="333333"/>
-                </a:solidFill>
-                <a:effectLst/>
-                <a:latin typeface="나눔고딕"/>
+              <a:rPr lang="ko-KR" altLang="en-US" sz="1400" b="0" i="0" smtClean="0">
+                <a:solidFill>
+                  <a:srgbClr val="333333"/>
+                </a:solidFill>
+                <a:effectLst/>
+                <a:latin typeface="나눔바른고딕" panose="020B0603020101020101" pitchFamily="50" charset="-127"/>
+                <a:ea typeface="나눔바른고딕" panose="020B0603020101020101" pitchFamily="50" charset="-127"/>
               </a:rPr>
               <a:t>대한민국 영화계는 </a:t>
             </a:r>
             <a:r>
-              <a:rPr lang="en-US" altLang="ko-KR" sz="1400" b="0" i="0" dirty="0" smtClean="0">
-                <a:solidFill>
-                  <a:srgbClr val="333333"/>
-                </a:solidFill>
-                <a:effectLst/>
-                <a:latin typeface="나눔고딕"/>
+              <a:rPr lang="en-US" altLang="ko-KR" sz="1400" b="0" i="0" smtClean="0">
+                <a:solidFill>
+                  <a:srgbClr val="333333"/>
+                </a:solidFill>
+                <a:effectLst/>
+                <a:latin typeface="나눔바른고딕" panose="020B0603020101020101" pitchFamily="50" charset="-127"/>
+                <a:ea typeface="나눔바른고딕" panose="020B0603020101020101" pitchFamily="50" charset="-127"/>
               </a:rPr>
               <a:t>B.U(Before </a:t>
             </a:r>
             <a:r>
-              <a:rPr lang="en-US" altLang="ko-KR" sz="1400" b="0" i="0" dirty="0" err="1" smtClean="0">
-                <a:solidFill>
-                  <a:srgbClr val="333333"/>
-                </a:solidFill>
-                <a:effectLst/>
-                <a:latin typeface="나눔고딕"/>
+              <a:rPr lang="en-US" altLang="ko-KR" sz="1400" b="0" i="0" err="1" smtClean="0">
+                <a:solidFill>
+                  <a:srgbClr val="333333"/>
+                </a:solidFill>
+                <a:effectLst/>
+                <a:latin typeface="나눔바른고딕" panose="020B0603020101020101" pitchFamily="50" charset="-127"/>
+                <a:ea typeface="나눔바른고딕" panose="020B0603020101020101" pitchFamily="50" charset="-127"/>
               </a:rPr>
               <a:t>UmBokDong</a:t>
             </a:r>
             <a:r>
-              <a:rPr lang="en-US" altLang="ko-KR" sz="1400" b="0" i="0" dirty="0" smtClean="0">
-                <a:solidFill>
-                  <a:srgbClr val="333333"/>
-                </a:solidFill>
-                <a:effectLst/>
-                <a:latin typeface="나눔고딕"/>
+              <a:rPr lang="en-US" altLang="ko-KR" sz="1400" b="0" i="0" smtClean="0">
+                <a:solidFill>
+                  <a:srgbClr val="333333"/>
+                </a:solidFill>
+                <a:effectLst/>
+                <a:latin typeface="나눔바른고딕" panose="020B0603020101020101" pitchFamily="50" charset="-127"/>
+                <a:ea typeface="나눔바른고딕" panose="020B0603020101020101" pitchFamily="50" charset="-127"/>
               </a:rPr>
               <a:t>), A.U(After </a:t>
             </a:r>
             <a:r>
-              <a:rPr lang="en-US" altLang="ko-KR" sz="1400" b="0" i="0" dirty="0" err="1" smtClean="0">
-                <a:solidFill>
-                  <a:srgbClr val="333333"/>
-                </a:solidFill>
-                <a:effectLst/>
-                <a:latin typeface="나눔고딕"/>
+              <a:rPr lang="en-US" altLang="ko-KR" sz="1400" b="0" i="0" err="1" smtClean="0">
+                <a:solidFill>
+                  <a:srgbClr val="333333"/>
+                </a:solidFill>
+                <a:effectLst/>
+                <a:latin typeface="나눔바른고딕" panose="020B0603020101020101" pitchFamily="50" charset="-127"/>
+                <a:ea typeface="나눔바른고딕" panose="020B0603020101020101" pitchFamily="50" charset="-127"/>
               </a:rPr>
               <a:t>UmBokDong</a:t>
             </a:r>
             <a:r>
-              <a:rPr lang="en-US" altLang="ko-KR" sz="1400" b="0" i="0" dirty="0" smtClean="0">
-                <a:solidFill>
-                  <a:srgbClr val="333333"/>
-                </a:solidFill>
-                <a:effectLst/>
-                <a:latin typeface="나눔고딕"/>
+              <a:rPr lang="en-US" altLang="ko-KR" sz="1400" b="0" i="0" smtClean="0">
+                <a:solidFill>
+                  <a:srgbClr val="333333"/>
+                </a:solidFill>
+                <a:effectLst/>
+                <a:latin typeface="나눔바른고딕" panose="020B0603020101020101" pitchFamily="50" charset="-127"/>
+                <a:ea typeface="나눔바른고딕" panose="020B0603020101020101" pitchFamily="50" charset="-127"/>
               </a:rPr>
               <a:t>)</a:t>
             </a:r>
             <a:r>
-              <a:rPr lang="ko-KR" altLang="en-US" sz="1400" b="0" i="0" dirty="0" smtClean="0">
-                <a:solidFill>
-                  <a:srgbClr val="333333"/>
-                </a:solidFill>
-                <a:effectLst/>
-                <a:latin typeface="나눔고딕"/>
+              <a:rPr lang="ko-KR" altLang="en-US" sz="1400" b="0" i="0" smtClean="0">
+                <a:solidFill>
+                  <a:srgbClr val="333333"/>
+                </a:solidFill>
+                <a:effectLst/>
+                <a:latin typeface="나눔바른고딕" panose="020B0603020101020101" pitchFamily="50" charset="-127"/>
+                <a:ea typeface="나눔바른고딕" panose="020B0603020101020101" pitchFamily="50" charset="-127"/>
               </a:rPr>
               <a:t>으로 </a:t>
             </a:r>
             <a:r>
-              <a:rPr lang="ko-KR" altLang="en-US" sz="1400" b="0" i="0" dirty="0" err="1" smtClean="0">
-                <a:solidFill>
-                  <a:srgbClr val="333333"/>
-                </a:solidFill>
-                <a:effectLst/>
-                <a:latin typeface="나눔고딕"/>
+              <a:rPr lang="ko-KR" altLang="en-US" sz="1400" b="0" i="0" err="1" smtClean="0">
+                <a:solidFill>
+                  <a:srgbClr val="333333"/>
+                </a:solidFill>
+                <a:effectLst/>
+                <a:latin typeface="나눔바른고딕" panose="020B0603020101020101" pitchFamily="50" charset="-127"/>
+                <a:ea typeface="나눔바른고딕" panose="020B0603020101020101" pitchFamily="50" charset="-127"/>
               </a:rPr>
               <a:t>나눌수</a:t>
             </a:r>
             <a:r>
-              <a:rPr lang="ko-KR" altLang="en-US" sz="1400" b="0" i="0" dirty="0" smtClean="0">
-                <a:solidFill>
-                  <a:srgbClr val="333333"/>
-                </a:solidFill>
-                <a:effectLst/>
-                <a:latin typeface="나눔고딕"/>
+              <a:rPr lang="ko-KR" altLang="en-US" sz="1400" b="0" i="0" smtClean="0">
+                <a:solidFill>
+                  <a:srgbClr val="333333"/>
+                </a:solidFill>
+                <a:effectLst/>
+                <a:latin typeface="나눔바른고딕" panose="020B0603020101020101" pitchFamily="50" charset="-127"/>
+                <a:ea typeface="나눔바른고딕" panose="020B0603020101020101" pitchFamily="50" charset="-127"/>
               </a:rPr>
               <a:t> 있다</a:t>
             </a:r>
             <a:r>
-              <a:rPr lang="en-US" altLang="ko-KR" sz="1400" b="0" i="0" dirty="0" smtClean="0">
-                <a:solidFill>
-                  <a:srgbClr val="333333"/>
-                </a:solidFill>
-                <a:effectLst/>
-                <a:latin typeface="나눔고딕"/>
+              <a:rPr lang="en-US" altLang="ko-KR" sz="1400" b="0" i="0" smtClean="0">
+                <a:solidFill>
+                  <a:srgbClr val="333333"/>
+                </a:solidFill>
+                <a:effectLst/>
+                <a:latin typeface="나눔바른고딕" panose="020B0603020101020101" pitchFamily="50" charset="-127"/>
+                <a:ea typeface="나눔바른고딕" panose="020B0603020101020101" pitchFamily="50" charset="-127"/>
               </a:rPr>
               <a:t>.</a:t>
             </a:r>
-            <a:endParaRPr lang="ko-KR" altLang="en-US" sz="1400" dirty="0"/>
+            <a:endParaRPr lang="ko-KR" altLang="en-US" sz="1400">
+              <a:latin typeface="나눔바른고딕" panose="020B0603020101020101" pitchFamily="50" charset="-127"/>
+              <a:ea typeface="나눔바른고딕" panose="020B0603020101020101" pitchFamily="50" charset="-127"/>
+            </a:endParaRPr>
           </a:p>
         </p:txBody>
       </p:sp>
@@ -3271,7 +3297,7 @@
         <p:spPr>
           <a:xfrm>
             <a:off x="962445" y="5663337"/>
-            <a:ext cx="2938625" cy="523220"/>
+            <a:ext cx="2589170" cy="523220"/>
           </a:xfrm>
           <a:prstGeom prst="rect">
             <a:avLst/>
@@ -3284,36 +3310,42 @@
           <a:lstStyle/>
           <a:p>
             <a:r>
-              <a:rPr lang="ko-KR" altLang="en-US" sz="2800" b="0" i="0" dirty="0" smtClean="0">
+              <a:rPr lang="ko-KR" altLang="en-US" sz="2800" b="0" i="0" smtClean="0">
                 <a:solidFill>
                   <a:srgbClr val="2A2A2A"/>
                 </a:solidFill>
                 <a:effectLst/>
-                <a:latin typeface="AppleSDGothicNeo-Regular"/>
+                <a:latin typeface="나눔바른고딕" panose="020B0603020101020101" pitchFamily="50" charset="-127"/>
+                <a:ea typeface="나눔바른고딕" panose="020B0603020101020101" pitchFamily="50" charset="-127"/>
               </a:rPr>
               <a:t>나만 </a:t>
             </a:r>
             <a:r>
-              <a:rPr lang="ko-KR" altLang="en-US" sz="2800" b="0" i="0" dirty="0" err="1" smtClean="0">
+              <a:rPr lang="ko-KR" altLang="en-US" sz="2800" b="0" i="0" err="1" smtClean="0">
                 <a:solidFill>
                   <a:srgbClr val="2A2A2A"/>
                 </a:solidFill>
                 <a:effectLst/>
-                <a:latin typeface="AppleSDGothicNeo-Regular"/>
+                <a:latin typeface="나눔바른고딕" panose="020B0603020101020101" pitchFamily="50" charset="-127"/>
+                <a:ea typeface="나눔바른고딕" panose="020B0603020101020101" pitchFamily="50" charset="-127"/>
               </a:rPr>
               <a:t>죽을순</a:t>
             </a:r>
             <a:r>
-              <a:rPr lang="ko-KR" altLang="en-US" sz="2800" b="0" i="0" dirty="0" smtClean="0">
+              <a:rPr lang="ko-KR" altLang="en-US" sz="2800" b="0" i="0" smtClean="0">
                 <a:solidFill>
                   <a:srgbClr val="2A2A2A"/>
                 </a:solidFill>
                 <a:effectLst/>
-                <a:latin typeface="AppleSDGothicNeo-Regular"/>
+                <a:latin typeface="나눔바른고딕" panose="020B0603020101020101" pitchFamily="50" charset="-127"/>
+                <a:ea typeface="나눔바른고딕" panose="020B0603020101020101" pitchFamily="50" charset="-127"/>
               </a:rPr>
               <a:t> 없지</a:t>
             </a:r>
-            <a:endParaRPr lang="ko-KR" altLang="en-US" sz="2800" dirty="0"/>
+            <a:endParaRPr lang="ko-KR" altLang="en-US" sz="2800">
+              <a:latin typeface="나눔바른고딕" panose="020B0603020101020101" pitchFamily="50" charset="-127"/>
+              <a:ea typeface="나눔바른고딕" panose="020B0603020101020101" pitchFamily="50" charset="-127"/>
+            </a:endParaRPr>
           </a:p>
         </p:txBody>
       </p:sp>
@@ -3363,66 +3395,75 @@
           <a:lstStyle/>
           <a:p>
             <a:r>
-              <a:rPr lang="ko-KR" altLang="en-US" sz="2000" b="0" i="0" dirty="0" smtClean="0">
-                <a:solidFill>
-                  <a:srgbClr val="333333"/>
-                </a:solidFill>
-                <a:effectLst/>
-                <a:latin typeface="나눔고딕"/>
+              <a:rPr lang="ko-KR" altLang="en-US" sz="2000" b="0" i="0" smtClean="0">
+                <a:solidFill>
+                  <a:srgbClr val="333333"/>
+                </a:solidFill>
+                <a:effectLst/>
+                <a:latin typeface="나눔바른고딕" panose="020B0603020101020101" pitchFamily="50" charset="-127"/>
+                <a:ea typeface="나눔바른고딕" panose="020B0603020101020101" pitchFamily="50" charset="-127"/>
               </a:rPr>
               <a:t>정말 </a:t>
             </a:r>
             <a:r>
-              <a:rPr lang="ko-KR" altLang="en-US" sz="2000" b="0" i="0" dirty="0" err="1" smtClean="0">
-                <a:solidFill>
-                  <a:srgbClr val="333333"/>
-                </a:solidFill>
-                <a:effectLst/>
-                <a:latin typeface="나눔고딕"/>
+              <a:rPr lang="ko-KR" altLang="en-US" sz="2000" b="0" i="0" err="1" smtClean="0">
+                <a:solidFill>
+                  <a:srgbClr val="333333"/>
+                </a:solidFill>
+                <a:effectLst/>
+                <a:latin typeface="나눔바른고딕" panose="020B0603020101020101" pitchFamily="50" charset="-127"/>
+                <a:ea typeface="나눔바른고딕" panose="020B0603020101020101" pitchFamily="50" charset="-127"/>
               </a:rPr>
               <a:t>재밌었습니다</a:t>
             </a:r>
             <a:r>
-              <a:rPr lang="ko-KR" altLang="en-US" sz="2000" b="0" i="0" dirty="0" smtClean="0">
-                <a:solidFill>
-                  <a:srgbClr val="333333"/>
-                </a:solidFill>
-                <a:effectLst/>
-                <a:latin typeface="나눔고딕"/>
+              <a:rPr lang="ko-KR" altLang="en-US" sz="2000" b="0" i="0" smtClean="0">
+                <a:solidFill>
+                  <a:srgbClr val="333333"/>
+                </a:solidFill>
+                <a:effectLst/>
+                <a:latin typeface="나눔바른고딕" panose="020B0603020101020101" pitchFamily="50" charset="-127"/>
+                <a:ea typeface="나눔바른고딕" panose="020B0603020101020101" pitchFamily="50" charset="-127"/>
               </a:rPr>
               <a:t> 보지는 않았지만 박진감 넘치는 </a:t>
             </a:r>
             <a:r>
-              <a:rPr lang="ko-KR" altLang="en-US" sz="2000" b="0" i="0" dirty="0" err="1" smtClean="0">
-                <a:solidFill>
-                  <a:srgbClr val="333333"/>
-                </a:solidFill>
-                <a:effectLst/>
-                <a:latin typeface="나눔고딕"/>
+              <a:rPr lang="ko-KR" altLang="en-US" sz="2000" b="0" i="0" err="1" smtClean="0">
+                <a:solidFill>
+                  <a:srgbClr val="333333"/>
+                </a:solidFill>
+                <a:effectLst/>
+                <a:latin typeface="나눔바른고딕" panose="020B0603020101020101" pitchFamily="50" charset="-127"/>
+                <a:ea typeface="나눔바른고딕" panose="020B0603020101020101" pitchFamily="50" charset="-127"/>
               </a:rPr>
               <a:t>액션씬과</a:t>
             </a:r>
             <a:r>
-              <a:rPr lang="ko-KR" altLang="en-US" sz="2000" b="0" i="0" dirty="0" smtClean="0">
-                <a:solidFill>
-                  <a:srgbClr val="333333"/>
-                </a:solidFill>
-                <a:effectLst/>
-                <a:latin typeface="나눔고딕"/>
+              <a:rPr lang="ko-KR" altLang="en-US" sz="2000" b="0" i="0" smtClean="0">
+                <a:solidFill>
+                  <a:srgbClr val="333333"/>
+                </a:solidFill>
+                <a:effectLst/>
+                <a:latin typeface="나눔바른고딕" panose="020B0603020101020101" pitchFamily="50" charset="-127"/>
+                <a:ea typeface="나눔바른고딕" panose="020B0603020101020101" pitchFamily="50" charset="-127"/>
               </a:rPr>
               <a:t> 탄탄한 스토리구성이 우매한 대중들의 마음을 사로잡아 사르르 녹여주는 것 같았습니다</a:t>
             </a:r>
             <a:r>
-              <a:rPr lang="en-US" altLang="ko-KR" sz="2000" b="0" i="0" dirty="0" smtClean="0">
-                <a:solidFill>
-                  <a:srgbClr val="333333"/>
-                </a:solidFill>
-                <a:effectLst/>
-                <a:latin typeface="나눔고딕"/>
+              <a:rPr lang="en-US" altLang="ko-KR" sz="2000" b="0" i="0" smtClean="0">
+                <a:solidFill>
+                  <a:srgbClr val="333333"/>
+                </a:solidFill>
+                <a:effectLst/>
+                <a:latin typeface="나눔바른고딕" panose="020B0603020101020101" pitchFamily="50" charset="-127"/>
+                <a:ea typeface="나눔바른고딕" panose="020B0603020101020101" pitchFamily="50" charset="-127"/>
               </a:rPr>
               <a:t>.</a:t>
             </a:r>
-            <a:endParaRPr lang="ko-KR" altLang="en-US" sz="2000" dirty="0"/>
+            <a:endParaRPr lang="ko-KR" altLang="en-US" sz="2000">
+              <a:latin typeface="나눔바른고딕" panose="020B0603020101020101" pitchFamily="50" charset="-127"/>
+              <a:ea typeface="나눔바른고딕" panose="020B0603020101020101" pitchFamily="50" charset="-127"/>
+            </a:endParaRPr>
           </a:p>
         </p:txBody>
       </p:sp>
@@ -3448,156 +3489,174 @@
           <a:lstStyle/>
           <a:p>
             <a:r>
-              <a:rPr lang="ko-KR" altLang="en-US" b="0" i="0" dirty="0" err="1" smtClean="0">
-                <a:solidFill>
-                  <a:srgbClr val="333333"/>
-                </a:solidFill>
-                <a:effectLst/>
-                <a:latin typeface="나눔고딕"/>
+              <a:rPr lang="ko-KR" altLang="en-US" b="0" i="0" err="1" smtClean="0">
+                <a:solidFill>
+                  <a:srgbClr val="333333"/>
+                </a:solidFill>
+                <a:effectLst/>
+                <a:latin typeface="나눔바른고딕" panose="020B0603020101020101" pitchFamily="50" charset="-127"/>
+                <a:ea typeface="나눔바른고딕" panose="020B0603020101020101" pitchFamily="50" charset="-127"/>
               </a:rPr>
               <a:t>뮤비</a:t>
             </a:r>
             <a:r>
-              <a:rPr lang="ko-KR" altLang="en-US" b="0" i="0" dirty="0" smtClean="0">
-                <a:solidFill>
-                  <a:srgbClr val="333333"/>
-                </a:solidFill>
-                <a:effectLst/>
-                <a:latin typeface="나눔고딕"/>
+              <a:rPr lang="ko-KR" altLang="en-US" b="0" i="0" smtClean="0">
+                <a:solidFill>
+                  <a:srgbClr val="333333"/>
+                </a:solidFill>
+                <a:effectLst/>
+                <a:latin typeface="나눔바른고딕" panose="020B0603020101020101" pitchFamily="50" charset="-127"/>
+                <a:ea typeface="나눔바른고딕" panose="020B0603020101020101" pitchFamily="50" charset="-127"/>
               </a:rPr>
               <a:t> </a:t>
             </a:r>
             <a:r>
-              <a:rPr lang="en-US" altLang="ko-KR" b="0" i="0" dirty="0" smtClean="0">
-                <a:solidFill>
-                  <a:srgbClr val="333333"/>
-                </a:solidFill>
-                <a:effectLst/>
-                <a:latin typeface="나눔고딕"/>
+              <a:rPr lang="en-US" altLang="ko-KR" b="0" i="0" smtClean="0">
+                <a:solidFill>
+                  <a:srgbClr val="333333"/>
+                </a:solidFill>
+                <a:effectLst/>
+                <a:latin typeface="나눔바른고딕" panose="020B0603020101020101" pitchFamily="50" charset="-127"/>
+                <a:ea typeface="나눔바른고딕" panose="020B0603020101020101" pitchFamily="50" charset="-127"/>
               </a:rPr>
               <a:t>'</a:t>
             </a:r>
             <a:r>
-              <a:rPr lang="ko-KR" altLang="en-US" b="0" i="0" dirty="0" smtClean="0">
-                <a:solidFill>
-                  <a:srgbClr val="333333"/>
-                </a:solidFill>
-                <a:effectLst/>
-                <a:latin typeface="나눔고딕"/>
+              <a:rPr lang="ko-KR" altLang="en-US" b="0" i="0" smtClean="0">
+                <a:solidFill>
+                  <a:srgbClr val="333333"/>
+                </a:solidFill>
+                <a:effectLst/>
+                <a:latin typeface="나눔바른고딕" panose="020B0603020101020101" pitchFamily="50" charset="-127"/>
+                <a:ea typeface="나눔바른고딕" panose="020B0603020101020101" pitchFamily="50" charset="-127"/>
               </a:rPr>
               <a:t>깡</a:t>
             </a:r>
             <a:r>
-              <a:rPr lang="en-US" altLang="ko-KR" b="0" i="0" dirty="0" smtClean="0">
-                <a:solidFill>
-                  <a:srgbClr val="333333"/>
-                </a:solidFill>
-                <a:effectLst/>
-                <a:latin typeface="나눔고딕"/>
+              <a:rPr lang="en-US" altLang="ko-KR" b="0" i="0" smtClean="0">
+                <a:solidFill>
+                  <a:srgbClr val="333333"/>
+                </a:solidFill>
+                <a:effectLst/>
+                <a:latin typeface="나눔바른고딕" panose="020B0603020101020101" pitchFamily="50" charset="-127"/>
+                <a:ea typeface="나눔바른고딕" panose="020B0603020101020101" pitchFamily="50" charset="-127"/>
               </a:rPr>
               <a:t>' </a:t>
             </a:r>
             <a:r>
-              <a:rPr lang="ko-KR" altLang="en-US" b="0" i="0" dirty="0" smtClean="0">
-                <a:solidFill>
-                  <a:srgbClr val="333333"/>
-                </a:solidFill>
-                <a:effectLst/>
-                <a:latin typeface="나눔고딕"/>
+              <a:rPr lang="ko-KR" altLang="en-US" b="0" i="0" smtClean="0">
+                <a:solidFill>
+                  <a:srgbClr val="333333"/>
+                </a:solidFill>
+                <a:effectLst/>
+                <a:latin typeface="나눔바른고딕" panose="020B0603020101020101" pitchFamily="50" charset="-127"/>
+                <a:ea typeface="나눔바른고딕" panose="020B0603020101020101" pitchFamily="50" charset="-127"/>
               </a:rPr>
               <a:t>과 함께 </a:t>
             </a:r>
             <a:r>
-              <a:rPr lang="en-US" altLang="ko-KR" b="0" i="0" dirty="0" smtClean="0">
-                <a:solidFill>
-                  <a:srgbClr val="333333"/>
-                </a:solidFill>
-                <a:effectLst/>
-                <a:latin typeface="나눔고딕"/>
+              <a:rPr lang="en-US" altLang="ko-KR" b="0" i="0" smtClean="0">
+                <a:solidFill>
+                  <a:srgbClr val="333333"/>
+                </a:solidFill>
+                <a:effectLst/>
+                <a:latin typeface="나눔바른고딕" panose="020B0603020101020101" pitchFamily="50" charset="-127"/>
+                <a:ea typeface="나눔바른고딕" panose="020B0603020101020101" pitchFamily="50" charset="-127"/>
               </a:rPr>
               <a:t>80</a:t>
             </a:r>
             <a:r>
-              <a:rPr lang="ko-KR" altLang="en-US" b="0" i="0" dirty="0" smtClean="0">
-                <a:solidFill>
-                  <a:srgbClr val="333333"/>
-                </a:solidFill>
-                <a:effectLst/>
-                <a:latin typeface="나눔고딕"/>
+              <a:rPr lang="ko-KR" altLang="en-US" b="0" i="0" smtClean="0">
+                <a:solidFill>
+                  <a:srgbClr val="333333"/>
+                </a:solidFill>
+                <a:effectLst/>
+                <a:latin typeface="나눔바른고딕" panose="020B0603020101020101" pitchFamily="50" charset="-127"/>
+                <a:ea typeface="나눔바른고딕" panose="020B0603020101020101" pitchFamily="50" charset="-127"/>
               </a:rPr>
               <a:t>만년 후 재평가 될 인류의 문화유산</a:t>
             </a:r>
             <a:r>
-              <a:rPr lang="en-US" altLang="ko-KR" b="0" i="0" dirty="0" smtClean="0">
-                <a:solidFill>
-                  <a:srgbClr val="333333"/>
-                </a:solidFill>
-                <a:effectLst/>
-                <a:latin typeface="나눔고딕"/>
+              <a:rPr lang="en-US" altLang="ko-KR" b="0" i="0" smtClean="0">
+                <a:solidFill>
+                  <a:srgbClr val="333333"/>
+                </a:solidFill>
+                <a:effectLst/>
+                <a:latin typeface="나눔바른고딕" panose="020B0603020101020101" pitchFamily="50" charset="-127"/>
+                <a:ea typeface="나눔바른고딕" panose="020B0603020101020101" pitchFamily="50" charset="-127"/>
               </a:rPr>
               <a:t>. </a:t>
             </a:r>
             <a:r>
-              <a:rPr lang="ko-KR" altLang="en-US" b="0" i="0" dirty="0" smtClean="0">
-                <a:solidFill>
-                  <a:srgbClr val="333333"/>
-                </a:solidFill>
-                <a:effectLst/>
-                <a:latin typeface="나눔고딕"/>
+              <a:rPr lang="ko-KR" altLang="en-US" b="0" i="0" smtClean="0">
+                <a:solidFill>
+                  <a:srgbClr val="333333"/>
+                </a:solidFill>
+                <a:effectLst/>
+                <a:latin typeface="나눔바른고딕" panose="020B0603020101020101" pitchFamily="50" charset="-127"/>
+                <a:ea typeface="나눔바른고딕" panose="020B0603020101020101" pitchFamily="50" charset="-127"/>
               </a:rPr>
               <a:t>비는 훗날 </a:t>
             </a:r>
             <a:r>
-              <a:rPr lang="en-US" altLang="ko-KR" b="0" i="0" dirty="0" smtClean="0">
-                <a:solidFill>
-                  <a:srgbClr val="333333"/>
-                </a:solidFill>
-                <a:effectLst/>
-                <a:latin typeface="나눔고딕"/>
+              <a:rPr lang="en-US" altLang="ko-KR" b="0" i="0" smtClean="0">
+                <a:solidFill>
+                  <a:srgbClr val="333333"/>
+                </a:solidFill>
+                <a:effectLst/>
+                <a:latin typeface="나눔바른고딕" panose="020B0603020101020101" pitchFamily="50" charset="-127"/>
+                <a:ea typeface="나눔바른고딕" panose="020B0603020101020101" pitchFamily="50" charset="-127"/>
               </a:rPr>
               <a:t>"</a:t>
             </a:r>
             <a:r>
-              <a:rPr lang="ko-KR" altLang="en-US" b="0" i="0" dirty="0" err="1" smtClean="0">
-                <a:solidFill>
-                  <a:srgbClr val="333333"/>
-                </a:solidFill>
-                <a:effectLst/>
-                <a:latin typeface="나눔고딕"/>
+              <a:rPr lang="ko-KR" altLang="en-US" b="0" i="0" err="1" smtClean="0">
+                <a:solidFill>
+                  <a:srgbClr val="333333"/>
+                </a:solidFill>
+                <a:effectLst/>
+                <a:latin typeface="나눔바른고딕" panose="020B0603020101020101" pitchFamily="50" charset="-127"/>
+                <a:ea typeface="나눔바른고딕" panose="020B0603020101020101" pitchFamily="50" charset="-127"/>
               </a:rPr>
               <a:t>깡치</a:t>
             </a:r>
             <a:r>
-              <a:rPr lang="en-US" altLang="ko-KR" b="0" i="0" dirty="0" smtClean="0">
-                <a:solidFill>
-                  <a:srgbClr val="333333"/>
-                </a:solidFill>
-                <a:effectLst/>
-                <a:latin typeface="나눔고딕"/>
+              <a:rPr lang="en-US" altLang="ko-KR" b="0" i="0" smtClean="0">
+                <a:solidFill>
+                  <a:srgbClr val="333333"/>
+                </a:solidFill>
+                <a:effectLst/>
+                <a:latin typeface="나눔바른고딕" panose="020B0603020101020101" pitchFamily="50" charset="-127"/>
+                <a:ea typeface="나눔바른고딕" panose="020B0603020101020101" pitchFamily="50" charset="-127"/>
               </a:rPr>
               <a:t>UBD"</a:t>
             </a:r>
             <a:r>
-              <a:rPr lang="ko-KR" altLang="en-US" b="0" i="0" dirty="0" smtClean="0">
-                <a:solidFill>
-                  <a:srgbClr val="333333"/>
-                </a:solidFill>
-                <a:effectLst/>
-                <a:latin typeface="나눔고딕"/>
+              <a:rPr lang="ko-KR" altLang="en-US" b="0" i="0" smtClean="0">
+                <a:solidFill>
+                  <a:srgbClr val="333333"/>
+                </a:solidFill>
+                <a:effectLst/>
+                <a:latin typeface="나눔바른고딕" panose="020B0603020101020101" pitchFamily="50" charset="-127"/>
+                <a:ea typeface="나눔바른고딕" panose="020B0603020101020101" pitchFamily="50" charset="-127"/>
               </a:rPr>
               <a:t>라는 수식어로 역사책에 실릴 것</a:t>
             </a:r>
             <a:r>
-              <a:rPr lang="en-US" altLang="ko-KR" b="0" i="0" dirty="0" smtClean="0">
-                <a:solidFill>
-                  <a:srgbClr val="333333"/>
-                </a:solidFill>
-                <a:effectLst/>
-                <a:latin typeface="나눔고딕"/>
+              <a:rPr lang="en-US" altLang="ko-KR" b="0" i="0" smtClean="0">
+                <a:solidFill>
+                  <a:srgbClr val="333333"/>
+                </a:solidFill>
+                <a:effectLst/>
+                <a:latin typeface="나눔바른고딕" panose="020B0603020101020101" pitchFamily="50" charset="-127"/>
+                <a:ea typeface="나눔바른고딕" panose="020B0603020101020101" pitchFamily="50" charset="-127"/>
               </a:rPr>
               <a:t>.</a:t>
             </a:r>
-            <a:endParaRPr lang="ko-KR" altLang="en-US" dirty="0"/>
+            <a:endParaRPr lang="ko-KR" altLang="en-US">
+              <a:latin typeface="나눔바른고딕" panose="020B0603020101020101" pitchFamily="50" charset="-127"/>
+              <a:ea typeface="나눔바른고딕" panose="020B0603020101020101" pitchFamily="50" charset="-127"/>
+            </a:endParaRPr>
           </a:p>
         </p:txBody>
       </p:sp>

</xml_diff>